<commit_message>
did the same process for the heart disease map, added missing key
i don't know why, but the process for creating the checkered US background didn't work for heart disease- it was somehow a different shape. however, the one i made for insurance was able to be scaled to the correct size and worked perfectly fine. weird

also just added the diagonal lines to the key manually in inkscape
</commit_message>
<xml_diff>
--- a/poster/Summer 2023 Poster.pptx
+++ b/poster/Summer 2023 Poster.pptx
@@ -104,6 +104,11 @@
       </a:defRPr>
     </a:lvl9pPr>
   </p:defaultTextStyle>
+  <p:extLst>
+    <p:ext uri="{EFAFB233-063F-42B5-8137-9DF3F51BA10A}">
+      <p15:sldGuideLst xmlns:p15="http://schemas.microsoft.com/office/powerpoint/2012/main"/>
+    </p:ext>
+  </p:extLst>
 </p:presentation>
 </file>
 
@@ -238,7 +243,7 @@
           <a:p>
             <a:fld id="{A8036ECF-F125-4E1E-AA5D-35F604C8D960}" type="datetimeFigureOut">
               <a:rPr lang="en-US" smtClean="0"/>
-              <a:t>20-Jul-23</a:t>
+              <a:t>21-Jul-23</a:t>
             </a:fld>
             <a:endParaRPr lang="en-US"/>
           </a:p>
@@ -408,7 +413,7 @@
           <a:p>
             <a:fld id="{A8036ECF-F125-4E1E-AA5D-35F604C8D960}" type="datetimeFigureOut">
               <a:rPr lang="en-US" smtClean="0"/>
-              <a:t>20-Jul-23</a:t>
+              <a:t>21-Jul-23</a:t>
             </a:fld>
             <a:endParaRPr lang="en-US"/>
           </a:p>
@@ -588,7 +593,7 @@
           <a:p>
             <a:fld id="{A8036ECF-F125-4E1E-AA5D-35F604C8D960}" type="datetimeFigureOut">
               <a:rPr lang="en-US" smtClean="0"/>
-              <a:t>20-Jul-23</a:t>
+              <a:t>21-Jul-23</a:t>
             </a:fld>
             <a:endParaRPr lang="en-US"/>
           </a:p>
@@ -758,7 +763,7 @@
           <a:p>
             <a:fld id="{A8036ECF-F125-4E1E-AA5D-35F604C8D960}" type="datetimeFigureOut">
               <a:rPr lang="en-US" smtClean="0"/>
-              <a:t>20-Jul-23</a:t>
+              <a:t>21-Jul-23</a:t>
             </a:fld>
             <a:endParaRPr lang="en-US"/>
           </a:p>
@@ -1002,7 +1007,7 @@
           <a:p>
             <a:fld id="{A8036ECF-F125-4E1E-AA5D-35F604C8D960}" type="datetimeFigureOut">
               <a:rPr lang="en-US" smtClean="0"/>
-              <a:t>20-Jul-23</a:t>
+              <a:t>21-Jul-23</a:t>
             </a:fld>
             <a:endParaRPr lang="en-US"/>
           </a:p>
@@ -1234,7 +1239,7 @@
           <a:p>
             <a:fld id="{A8036ECF-F125-4E1E-AA5D-35F604C8D960}" type="datetimeFigureOut">
               <a:rPr lang="en-US" smtClean="0"/>
-              <a:t>20-Jul-23</a:t>
+              <a:t>21-Jul-23</a:t>
             </a:fld>
             <a:endParaRPr lang="en-US"/>
           </a:p>
@@ -1601,7 +1606,7 @@
           <a:p>
             <a:fld id="{A8036ECF-F125-4E1E-AA5D-35F604C8D960}" type="datetimeFigureOut">
               <a:rPr lang="en-US" smtClean="0"/>
-              <a:t>20-Jul-23</a:t>
+              <a:t>21-Jul-23</a:t>
             </a:fld>
             <a:endParaRPr lang="en-US"/>
           </a:p>
@@ -1719,7 +1724,7 @@
           <a:p>
             <a:fld id="{A8036ECF-F125-4E1E-AA5D-35F604C8D960}" type="datetimeFigureOut">
               <a:rPr lang="en-US" smtClean="0"/>
-              <a:t>20-Jul-23</a:t>
+              <a:t>21-Jul-23</a:t>
             </a:fld>
             <a:endParaRPr lang="en-US"/>
           </a:p>
@@ -1814,7 +1819,7 @@
           <a:p>
             <a:fld id="{A8036ECF-F125-4E1E-AA5D-35F604C8D960}" type="datetimeFigureOut">
               <a:rPr lang="en-US" smtClean="0"/>
-              <a:t>20-Jul-23</a:t>
+              <a:t>21-Jul-23</a:t>
             </a:fld>
             <a:endParaRPr lang="en-US"/>
           </a:p>
@@ -2091,7 +2096,7 @@
           <a:p>
             <a:fld id="{A8036ECF-F125-4E1E-AA5D-35F604C8D960}" type="datetimeFigureOut">
               <a:rPr lang="en-US" smtClean="0"/>
-              <a:t>20-Jul-23</a:t>
+              <a:t>21-Jul-23</a:t>
             </a:fld>
             <a:endParaRPr lang="en-US"/>
           </a:p>
@@ -2348,7 +2353,7 @@
           <a:p>
             <a:fld id="{A8036ECF-F125-4E1E-AA5D-35F604C8D960}" type="datetimeFigureOut">
               <a:rPr lang="en-US" smtClean="0"/>
-              <a:t>20-Jul-23</a:t>
+              <a:t>21-Jul-23</a:t>
             </a:fld>
             <a:endParaRPr lang="en-US"/>
           </a:p>
@@ -2561,7 +2566,7 @@
           <a:p>
             <a:fld id="{A8036ECF-F125-4E1E-AA5D-35F604C8D960}" type="datetimeFigureOut">
               <a:rPr lang="en-US" smtClean="0"/>
-              <a:t>20-Jul-23</a:t>
+              <a:t>21-Jul-23</a:t>
             </a:fld>
             <a:endParaRPr lang="en-US"/>
           </a:p>
@@ -3098,12 +3103,105 @@
           </p:spPr>
         </p:pic>
       </p:grpSp>
+      <p:grpSp>
+        <p:nvGrpSpPr>
+          <p:cNvPr id="22" name="Group 21">
+            <a:extLst>
+              <a:ext uri="{FF2B5EF4-FFF2-40B4-BE49-F238E27FC236}">
+                <a16:creationId xmlns:a16="http://schemas.microsoft.com/office/drawing/2014/main" id="{F57F16FB-7E3A-73F8-232C-FC721C9929C3}"/>
+              </a:ext>
+            </a:extLst>
+          </p:cNvPr>
+          <p:cNvGrpSpPr/>
+          <p:nvPr/>
+        </p:nvGrpSpPr>
+        <p:grpSpPr>
+          <a:xfrm>
+            <a:off x="6110392" y="15623704"/>
+            <a:ext cx="16559148" cy="10814990"/>
+            <a:chOff x="7485070" y="15690653"/>
+            <a:chExt cx="16559148" cy="10814990"/>
+          </a:xfrm>
+        </p:grpSpPr>
+        <p:pic>
+          <p:nvPicPr>
+            <p:cNvPr id="20" name="Picture 19" descr="A map of the united states&#10;&#10;Description automatically generated">
+              <a:extLst>
+                <a:ext uri="{FF2B5EF4-FFF2-40B4-BE49-F238E27FC236}">
+                  <a16:creationId xmlns:a16="http://schemas.microsoft.com/office/drawing/2014/main" id="{A3FEAB95-CD38-FD4F-DFF7-937AB0CBEF33}"/>
+                </a:ext>
+              </a:extLst>
+            </p:cNvPr>
+            <p:cNvPicPr>
+              <a:picLocks noChangeAspect="1"/>
+            </p:cNvPicPr>
+            <p:nvPr/>
+          </p:nvPicPr>
+          <p:blipFill>
+            <a:blip r:embed="rId4">
+              <a:extLst>
+                <a:ext uri="{28A0092B-C50C-407E-A947-70E740481C1C}">
+                  <a14:useLocalDpi xmlns:a14="http://schemas.microsoft.com/office/drawing/2010/main" val="0"/>
+                </a:ext>
+              </a:extLst>
+            </a:blip>
+            <a:stretch>
+              <a:fillRect/>
+            </a:stretch>
+          </p:blipFill>
+          <p:spPr>
+            <a:xfrm>
+              <a:off x="7485070" y="15690653"/>
+              <a:ext cx="16559148" cy="10814990"/>
+            </a:xfrm>
+            <a:prstGeom prst="rect">
+              <a:avLst/>
+            </a:prstGeom>
+          </p:spPr>
+        </p:pic>
+        <p:pic>
+          <p:nvPicPr>
+            <p:cNvPr id="16" name="Picture 15">
+              <a:extLst>
+                <a:ext uri="{FF2B5EF4-FFF2-40B4-BE49-F238E27FC236}">
+                  <a16:creationId xmlns:a16="http://schemas.microsoft.com/office/drawing/2014/main" id="{548669A5-A0A9-AF08-D62A-9973ACAC3C65}"/>
+                </a:ext>
+              </a:extLst>
+            </p:cNvPr>
+            <p:cNvPicPr>
+              <a:picLocks noChangeAspect="1"/>
+            </p:cNvPicPr>
+            <p:nvPr/>
+          </p:nvPicPr>
+          <p:blipFill>
+            <a:blip r:embed="rId6">
+              <a:extLst>
+                <a:ext uri="{28A0092B-C50C-407E-A947-70E740481C1C}">
+                  <a14:useLocalDpi xmlns:a14="http://schemas.microsoft.com/office/drawing/2010/main" val="0"/>
+                </a:ext>
+              </a:extLst>
+            </a:blip>
+            <a:stretch>
+              <a:fillRect/>
+            </a:stretch>
+          </p:blipFill>
+          <p:spPr>
+            <a:xfrm>
+              <a:off x="8159352" y="16362492"/>
+              <a:ext cx="13824966" cy="9684258"/>
+            </a:xfrm>
+            <a:prstGeom prst="rect">
+              <a:avLst/>
+            </a:prstGeom>
+          </p:spPr>
+        </p:pic>
+      </p:grpSp>
       <p:pic>
         <p:nvPicPr>
-          <p:cNvPr id="30" name="Picture 29">
+          <p:cNvPr id="3" name="Picture 2">
             <a:extLst>
               <a:ext uri="{FF2B5EF4-FFF2-40B4-BE49-F238E27FC236}">
-                <a16:creationId xmlns:a16="http://schemas.microsoft.com/office/drawing/2014/main" id="{18746F3F-3039-7607-54CA-3A54AAE6806F}"/>
+                <a16:creationId xmlns:a16="http://schemas.microsoft.com/office/drawing/2014/main" id="{960F50A0-F4CC-BDB0-6488-32B172573ECA}"/>
               </a:ext>
             </a:extLst>
           </p:cNvPr>
@@ -3113,7 +3211,7 @@
           <p:nvPr/>
         </p:nvPicPr>
         <p:blipFill>
-          <a:blip r:embed="rId6">
+          <a:blip r:embed="rId7">
             <a:extLst>
               <a:ext uri="{28A0092B-C50C-407E-A947-70E740481C1C}">
                 <a14:useLocalDpi xmlns:a14="http://schemas.microsoft.com/office/drawing/2010/main" val="0"/>
@@ -3126,8 +3224,44 @@
         </p:blipFill>
         <p:spPr>
           <a:xfrm>
-            <a:off x="20324461" y="9196864"/>
-            <a:ext cx="3084592" cy="3342095"/>
+            <a:off x="21666200" y="18926937"/>
+            <a:ext cx="2616200" cy="3090806"/>
+          </a:xfrm>
+          <a:prstGeom prst="rect">
+            <a:avLst/>
+          </a:prstGeom>
+        </p:spPr>
+      </p:pic>
+      <p:pic>
+        <p:nvPicPr>
+          <p:cNvPr id="6" name="Picture 5">
+            <a:extLst>
+              <a:ext uri="{FF2B5EF4-FFF2-40B4-BE49-F238E27FC236}">
+                <a16:creationId xmlns:a16="http://schemas.microsoft.com/office/drawing/2014/main" id="{631043B4-F266-2D8C-A9E6-427260CE80B7}"/>
+              </a:ext>
+            </a:extLst>
+          </p:cNvPr>
+          <p:cNvPicPr>
+            <a:picLocks noChangeAspect="1"/>
+          </p:cNvPicPr>
+          <p:nvPr/>
+        </p:nvPicPr>
+        <p:blipFill>
+          <a:blip r:embed="rId8">
+            <a:extLst>
+              <a:ext uri="{28A0092B-C50C-407E-A947-70E740481C1C}">
+                <a14:useLocalDpi xmlns:a14="http://schemas.microsoft.com/office/drawing/2010/main" val="0"/>
+              </a:ext>
+            </a:extLst>
+          </a:blip>
+          <a:stretch>
+            <a:fillRect/>
+          </a:stretch>
+        </p:blipFill>
+        <p:spPr>
+          <a:xfrm>
+            <a:off x="20609640" y="8274733"/>
+            <a:ext cx="2778680" cy="2928020"/>
           </a:xfrm>
           <a:prstGeom prst="rect">
             <a:avLst/>

</xml_diff>

<commit_message>
added methodology arrow, started some design of the sections
</commit_message>
<xml_diff>
--- a/poster/Summer 2023 Poster.pptx
+++ b/poster/Summer 2023 Poster.pptx
@@ -2973,10 +2973,10 @@
       </p:grpSpPr>
       <p:pic>
         <p:nvPicPr>
-          <p:cNvPr id="5" name="Graphic 4">
+          <p:cNvPr id="33" name="Graphic 32">
             <a:extLst>
               <a:ext uri="{FF2B5EF4-FFF2-40B4-BE49-F238E27FC236}">
-                <a16:creationId xmlns:a16="http://schemas.microsoft.com/office/drawing/2014/main" id="{6F974D1B-1462-84A5-C95B-7514F49C3259}"/>
+                <a16:creationId xmlns:a16="http://schemas.microsoft.com/office/drawing/2014/main" id="{D8B848A0-9B88-AB72-ABB6-F323DECD10D4}"/>
               </a:ext>
             </a:extLst>
           </p:cNvPr>
@@ -3002,6 +3002,45 @@
         </p:blipFill>
         <p:spPr>
           <a:xfrm>
+            <a:off x="12732771" y="26466707"/>
+            <a:ext cx="6162675" cy="6543675"/>
+          </a:xfrm>
+          <a:prstGeom prst="rect">
+            <a:avLst/>
+          </a:prstGeom>
+        </p:spPr>
+      </p:pic>
+      <p:pic>
+        <p:nvPicPr>
+          <p:cNvPr id="5" name="Graphic 4">
+            <a:extLst>
+              <a:ext uri="{FF2B5EF4-FFF2-40B4-BE49-F238E27FC236}">
+                <a16:creationId xmlns:a16="http://schemas.microsoft.com/office/drawing/2014/main" id="{6F974D1B-1462-84A5-C95B-7514F49C3259}"/>
+              </a:ext>
+            </a:extLst>
+          </p:cNvPr>
+          <p:cNvPicPr>
+            <a:picLocks noChangeAspect="1"/>
+          </p:cNvPicPr>
+          <p:nvPr/>
+        </p:nvPicPr>
+        <p:blipFill>
+          <a:blip r:embed="rId4">
+            <a:extLst>
+              <a:ext uri="{28A0092B-C50C-407E-A947-70E740481C1C}">
+                <a14:useLocalDpi xmlns:a14="http://schemas.microsoft.com/office/drawing/2010/main" val="0"/>
+              </a:ext>
+              <a:ext uri="{96DAC541-7B7A-43D3-8B79-37D633B846F1}">
+                <asvg:svgBlip xmlns:asvg="http://schemas.microsoft.com/office/drawing/2016/SVG/main" r:embed="rId5"/>
+              </a:ext>
+            </a:extLst>
+          </a:blip>
+          <a:stretch>
+            <a:fillRect/>
+          </a:stretch>
+        </p:blipFill>
+        <p:spPr>
+          <a:xfrm>
             <a:off x="11476338" y="17777205"/>
             <a:ext cx="9965723" cy="6507989"/>
           </a:xfrm>
@@ -3045,7 +3084,7 @@
             <p:nvPr/>
           </p:nvPicPr>
           <p:blipFill>
-            <a:blip r:embed="rId4">
+            <a:blip r:embed="rId6">
               <a:extLst>
                 <a:ext uri="{28A0092B-C50C-407E-A947-70E740481C1C}">
                   <a14:useLocalDpi xmlns:a14="http://schemas.microsoft.com/office/drawing/2010/main" val="0"/>
@@ -3081,7 +3120,7 @@
             <p:nvPr/>
           </p:nvPicPr>
           <p:blipFill>
-            <a:blip r:embed="rId5">
+            <a:blip r:embed="rId7">
               <a:extLst>
                 <a:ext uri="{28A0092B-C50C-407E-A947-70E740481C1C}">
                   <a14:useLocalDpi xmlns:a14="http://schemas.microsoft.com/office/drawing/2010/main" val="0"/>
@@ -3117,7 +3156,7 @@
         </p:nvGrpSpPr>
         <p:grpSpPr>
           <a:xfrm>
-            <a:off x="6110392" y="15623704"/>
+            <a:off x="6038674" y="14739187"/>
             <a:ext cx="16559148" cy="10814990"/>
             <a:chOff x="7485070" y="15690653"/>
             <a:chExt cx="16559148" cy="10814990"/>
@@ -3138,7 +3177,7 @@
             <p:nvPr/>
           </p:nvPicPr>
           <p:blipFill>
-            <a:blip r:embed="rId4">
+            <a:blip r:embed="rId6">
               <a:extLst>
                 <a:ext uri="{28A0092B-C50C-407E-A947-70E740481C1C}">
                   <a14:useLocalDpi xmlns:a14="http://schemas.microsoft.com/office/drawing/2010/main" val="0"/>
@@ -3174,7 +3213,7 @@
             <p:nvPr/>
           </p:nvPicPr>
           <p:blipFill>
-            <a:blip r:embed="rId6">
+            <a:blip r:embed="rId8">
               <a:extLst>
                 <a:ext uri="{28A0092B-C50C-407E-A947-70E740481C1C}">
                   <a14:useLocalDpi xmlns:a14="http://schemas.microsoft.com/office/drawing/2010/main" val="0"/>
@@ -3211,7 +3250,7 @@
           <p:nvPr/>
         </p:nvPicPr>
         <p:blipFill>
-          <a:blip r:embed="rId7">
+          <a:blip r:embed="rId9">
             <a:extLst>
               <a:ext uri="{28A0092B-C50C-407E-A947-70E740481C1C}">
                 <a14:useLocalDpi xmlns:a14="http://schemas.microsoft.com/office/drawing/2010/main" val="0"/>
@@ -3247,7 +3286,7 @@
           <p:nvPr/>
         </p:nvPicPr>
         <p:blipFill>
-          <a:blip r:embed="rId8">
+          <a:blip r:embed="rId10">
             <a:extLst>
               <a:ext uri="{28A0092B-C50C-407E-A947-70E740481C1C}">
                 <a14:useLocalDpi xmlns:a14="http://schemas.microsoft.com/office/drawing/2010/main" val="0"/>
@@ -3268,6 +3307,648 @@
           </a:prstGeom>
         </p:spPr>
       </p:pic>
+      <p:sp>
+        <p:nvSpPr>
+          <p:cNvPr id="26" name="TextBox 25">
+            <a:extLst>
+              <a:ext uri="{FF2B5EF4-FFF2-40B4-BE49-F238E27FC236}">
+                <a16:creationId xmlns:a16="http://schemas.microsoft.com/office/drawing/2014/main" id="{971D740A-7C26-56AE-1500-6DA8C1FB7162}"/>
+              </a:ext>
+            </a:extLst>
+          </p:cNvPr>
+          <p:cNvSpPr txBox="1"/>
+          <p:nvPr/>
+        </p:nvSpPr>
+        <p:spPr>
+          <a:xfrm>
+            <a:off x="14818288" y="26551489"/>
+            <a:ext cx="1991639" cy="369332"/>
+          </a:xfrm>
+          <a:prstGeom prst="rect">
+            <a:avLst/>
+          </a:prstGeom>
+          <a:noFill/>
+        </p:spPr>
+        <p:txBody>
+          <a:bodyPr wrap="square" rtlCol="0">
+            <a:spAutoFit/>
+          </a:bodyPr>
+          <a:lstStyle/>
+          <a:p>
+            <a:pPr algn="ctr"/>
+            <a:r>
+              <a:rPr lang="en-US" dirty="0"/>
+              <a:t>Data collection</a:t>
+            </a:r>
+          </a:p>
+        </p:txBody>
+      </p:sp>
+      <p:sp>
+        <p:nvSpPr>
+          <p:cNvPr id="28" name="TextBox 27">
+            <a:extLst>
+              <a:ext uri="{FF2B5EF4-FFF2-40B4-BE49-F238E27FC236}">
+                <a16:creationId xmlns:a16="http://schemas.microsoft.com/office/drawing/2014/main" id="{B6E54B56-9CC2-24B5-4E3C-C8D0498AE332}"/>
+              </a:ext>
+            </a:extLst>
+          </p:cNvPr>
+          <p:cNvSpPr txBox="1"/>
+          <p:nvPr/>
+        </p:nvSpPr>
+        <p:spPr>
+          <a:xfrm>
+            <a:off x="14091781" y="28229051"/>
+            <a:ext cx="3432131" cy="369333"/>
+          </a:xfrm>
+          <a:prstGeom prst="rect">
+            <a:avLst/>
+          </a:prstGeom>
+          <a:noFill/>
+        </p:spPr>
+        <p:txBody>
+          <a:bodyPr wrap="square" rtlCol="0">
+            <a:spAutoFit/>
+          </a:bodyPr>
+          <a:lstStyle/>
+          <a:p>
+            <a:pPr algn="ctr"/>
+            <a:r>
+              <a:rPr lang="en-US" dirty="0"/>
+              <a:t>Preliminary Analysis</a:t>
+            </a:r>
+          </a:p>
+        </p:txBody>
+      </p:sp>
+      <p:pic>
+        <p:nvPicPr>
+          <p:cNvPr id="30" name="Graphic 29">
+            <a:extLst>
+              <a:ext uri="{FF2B5EF4-FFF2-40B4-BE49-F238E27FC236}">
+                <a16:creationId xmlns:a16="http://schemas.microsoft.com/office/drawing/2014/main" id="{EC864003-07EB-7E7C-0B72-C8B061963054}"/>
+              </a:ext>
+            </a:extLst>
+          </p:cNvPr>
+          <p:cNvPicPr>
+            <a:picLocks noChangeAspect="1"/>
+          </p:cNvPicPr>
+          <p:nvPr/>
+        </p:nvPicPr>
+        <p:blipFill>
+          <a:blip r:embed="rId11">
+            <a:extLst>
+              <a:ext uri="{96DAC541-7B7A-43D3-8B79-37D633B846F1}">
+                <asvg:svgBlip xmlns:asvg="http://schemas.microsoft.com/office/drawing/2016/SVG/main" r:embed="rId12"/>
+              </a:ext>
+            </a:extLst>
+          </a:blip>
+          <a:stretch>
+            <a:fillRect/>
+          </a:stretch>
+        </p:blipFill>
+        <p:spPr>
+          <a:xfrm>
+            <a:off x="16149637" y="20935950"/>
+            <a:ext cx="619125" cy="190500"/>
+          </a:xfrm>
+          <a:prstGeom prst="rect">
+            <a:avLst/>
+          </a:prstGeom>
+        </p:spPr>
+      </p:pic>
+      <p:sp>
+        <p:nvSpPr>
+          <p:cNvPr id="34" name="TextBox 33">
+            <a:extLst>
+              <a:ext uri="{FF2B5EF4-FFF2-40B4-BE49-F238E27FC236}">
+                <a16:creationId xmlns:a16="http://schemas.microsoft.com/office/drawing/2014/main" id="{80A0DDDB-EEAB-1945-120D-8294488A7BFB}"/>
+              </a:ext>
+            </a:extLst>
+          </p:cNvPr>
+          <p:cNvSpPr txBox="1"/>
+          <p:nvPr/>
+        </p:nvSpPr>
+        <p:spPr>
+          <a:xfrm>
+            <a:off x="14457034" y="27106620"/>
+            <a:ext cx="1364338" cy="830997"/>
+          </a:xfrm>
+          <a:prstGeom prst="rect">
+            <a:avLst/>
+          </a:prstGeom>
+          <a:noFill/>
+        </p:spPr>
+        <p:txBody>
+          <a:bodyPr wrap="square" rtlCol="0">
+            <a:spAutoFit/>
+          </a:bodyPr>
+          <a:lstStyle/>
+          <a:p>
+            <a:pPr algn="ctr"/>
+            <a:r>
+              <a:rPr lang="en-US" sz="1200" dirty="0"/>
+              <a:t>Expansion Status, Heart Disease, Insurance Coverage</a:t>
+            </a:r>
+          </a:p>
+        </p:txBody>
+      </p:sp>
+      <p:sp>
+        <p:nvSpPr>
+          <p:cNvPr id="35" name="TextBox 34">
+            <a:extLst>
+              <a:ext uri="{FF2B5EF4-FFF2-40B4-BE49-F238E27FC236}">
+                <a16:creationId xmlns:a16="http://schemas.microsoft.com/office/drawing/2014/main" id="{D7CA5375-0545-9170-D3E8-1D0AA450D27A}"/>
+              </a:ext>
+            </a:extLst>
+          </p:cNvPr>
+          <p:cNvSpPr txBox="1"/>
+          <p:nvPr/>
+        </p:nvSpPr>
+        <p:spPr>
+          <a:xfrm>
+            <a:off x="15821372" y="27066691"/>
+            <a:ext cx="1364338" cy="369332"/>
+          </a:xfrm>
+          <a:prstGeom prst="rect">
+            <a:avLst/>
+          </a:prstGeom>
+          <a:noFill/>
+        </p:spPr>
+        <p:txBody>
+          <a:bodyPr wrap="square" rtlCol="0">
+            <a:spAutoFit/>
+          </a:bodyPr>
+          <a:lstStyle/>
+          <a:p>
+            <a:pPr algn="ctr"/>
+            <a:r>
+              <a:rPr lang="en-US" dirty="0"/>
+              <a:t>Covariates</a:t>
+            </a:r>
+          </a:p>
+        </p:txBody>
+      </p:sp>
+      <p:sp>
+        <p:nvSpPr>
+          <p:cNvPr id="36" name="TextBox 35">
+            <a:extLst>
+              <a:ext uri="{FF2B5EF4-FFF2-40B4-BE49-F238E27FC236}">
+                <a16:creationId xmlns:a16="http://schemas.microsoft.com/office/drawing/2014/main" id="{C8A5B826-2637-5863-D9F6-A4291E9C433A}"/>
+              </a:ext>
+            </a:extLst>
+          </p:cNvPr>
+          <p:cNvSpPr txBox="1"/>
+          <p:nvPr/>
+        </p:nvSpPr>
+        <p:spPr>
+          <a:xfrm>
+            <a:off x="13903889" y="28774063"/>
+            <a:ext cx="1991639" cy="523220"/>
+          </a:xfrm>
+          <a:prstGeom prst="rect">
+            <a:avLst/>
+          </a:prstGeom>
+          <a:noFill/>
+        </p:spPr>
+        <p:txBody>
+          <a:bodyPr wrap="square" rtlCol="0">
+            <a:spAutoFit/>
+          </a:bodyPr>
+          <a:lstStyle/>
+          <a:p>
+            <a:pPr algn="ctr"/>
+            <a:r>
+              <a:rPr lang="en-US" sz="1400" dirty="0"/>
+              <a:t>Mapping Heart Disease &amp; Insurance</a:t>
+            </a:r>
+          </a:p>
+        </p:txBody>
+      </p:sp>
+      <p:sp>
+        <p:nvSpPr>
+          <p:cNvPr id="37" name="TextBox 36">
+            <a:extLst>
+              <a:ext uri="{FF2B5EF4-FFF2-40B4-BE49-F238E27FC236}">
+                <a16:creationId xmlns:a16="http://schemas.microsoft.com/office/drawing/2014/main" id="{214AF3B2-28AB-A08A-596E-60D0293BD356}"/>
+              </a:ext>
+            </a:extLst>
+          </p:cNvPr>
+          <p:cNvSpPr txBox="1"/>
+          <p:nvPr/>
+        </p:nvSpPr>
+        <p:spPr>
+          <a:xfrm>
+            <a:off x="15807845" y="28794270"/>
+            <a:ext cx="1991639" cy="738664"/>
+          </a:xfrm>
+          <a:prstGeom prst="rect">
+            <a:avLst/>
+          </a:prstGeom>
+          <a:noFill/>
+        </p:spPr>
+        <p:txBody>
+          <a:bodyPr wrap="square" rtlCol="0">
+            <a:spAutoFit/>
+          </a:bodyPr>
+          <a:lstStyle/>
+          <a:p>
+            <a:pPr algn="ctr"/>
+            <a:r>
+              <a:rPr lang="en-US" sz="1400" dirty="0"/>
+              <a:t>Comparison by Grouping</a:t>
+            </a:r>
+          </a:p>
+          <a:p>
+            <a:pPr algn="ctr"/>
+            <a:r>
+              <a:rPr lang="en-US" sz="1400" dirty="0"/>
+              <a:t>Social Factor Comparisons</a:t>
+            </a:r>
+          </a:p>
+        </p:txBody>
+      </p:sp>
+      <p:sp>
+        <p:nvSpPr>
+          <p:cNvPr id="39" name="TextBox 38">
+            <a:extLst>
+              <a:ext uri="{FF2B5EF4-FFF2-40B4-BE49-F238E27FC236}">
+                <a16:creationId xmlns:a16="http://schemas.microsoft.com/office/drawing/2014/main" id="{7079AD76-8F05-8B28-E021-D45A9334565E}"/>
+              </a:ext>
+            </a:extLst>
+          </p:cNvPr>
+          <p:cNvSpPr txBox="1"/>
+          <p:nvPr/>
+        </p:nvSpPr>
+        <p:spPr>
+          <a:xfrm>
+            <a:off x="13622055" y="29896966"/>
+            <a:ext cx="4371582" cy="368214"/>
+          </a:xfrm>
+          <a:prstGeom prst="rect">
+            <a:avLst/>
+          </a:prstGeom>
+          <a:noFill/>
+        </p:spPr>
+        <p:txBody>
+          <a:bodyPr wrap="square" rtlCol="0">
+            <a:spAutoFit/>
+          </a:bodyPr>
+          <a:lstStyle/>
+          <a:p>
+            <a:pPr algn="ctr"/>
+            <a:r>
+              <a:rPr lang="en-US" dirty="0">
+                <a:solidFill>
+                  <a:schemeClr val="bg1"/>
+                </a:solidFill>
+              </a:rPr>
+              <a:t>National Causal Effect Analysis</a:t>
+            </a:r>
+          </a:p>
+        </p:txBody>
+      </p:sp>
+      <p:sp>
+        <p:nvSpPr>
+          <p:cNvPr id="40" name="TextBox 39">
+            <a:extLst>
+              <a:ext uri="{FF2B5EF4-FFF2-40B4-BE49-F238E27FC236}">
+                <a16:creationId xmlns:a16="http://schemas.microsoft.com/office/drawing/2014/main" id="{348282DC-BD15-59B2-F88D-0A059474DD1D}"/>
+              </a:ext>
+            </a:extLst>
+          </p:cNvPr>
+          <p:cNvSpPr txBox="1"/>
+          <p:nvPr/>
+        </p:nvSpPr>
+        <p:spPr>
+          <a:xfrm>
+            <a:off x="13490532" y="30435885"/>
+            <a:ext cx="2438181" cy="523220"/>
+          </a:xfrm>
+          <a:prstGeom prst="rect">
+            <a:avLst/>
+          </a:prstGeom>
+          <a:noFill/>
+        </p:spPr>
+        <p:txBody>
+          <a:bodyPr wrap="square" rtlCol="0">
+            <a:spAutoFit/>
+          </a:bodyPr>
+          <a:lstStyle/>
+          <a:p>
+            <a:pPr algn="ctr"/>
+            <a:r>
+              <a:rPr lang="en-US" sz="1400" dirty="0">
+                <a:solidFill>
+                  <a:schemeClr val="bg1"/>
+                </a:solidFill>
+              </a:rPr>
+              <a:t>Two-stage Difference-in-Difference Regression</a:t>
+            </a:r>
+          </a:p>
+        </p:txBody>
+      </p:sp>
+      <p:sp>
+        <p:nvSpPr>
+          <p:cNvPr id="41" name="TextBox 40">
+            <a:extLst>
+              <a:ext uri="{FF2B5EF4-FFF2-40B4-BE49-F238E27FC236}">
+                <a16:creationId xmlns:a16="http://schemas.microsoft.com/office/drawing/2014/main" id="{F251B8CC-AF5B-2BDF-A217-38E6034520FE}"/>
+              </a:ext>
+            </a:extLst>
+          </p:cNvPr>
+          <p:cNvSpPr txBox="1"/>
+          <p:nvPr/>
+        </p:nvSpPr>
+        <p:spPr>
+          <a:xfrm>
+            <a:off x="15821371" y="30422755"/>
+            <a:ext cx="2438181" cy="523220"/>
+          </a:xfrm>
+          <a:prstGeom prst="rect">
+            <a:avLst/>
+          </a:prstGeom>
+          <a:noFill/>
+        </p:spPr>
+        <p:txBody>
+          <a:bodyPr wrap="square" rtlCol="0">
+            <a:spAutoFit/>
+          </a:bodyPr>
+          <a:lstStyle/>
+          <a:p>
+            <a:pPr algn="ctr"/>
+            <a:r>
+              <a:rPr lang="en-US" sz="1400" dirty="0">
+                <a:solidFill>
+                  <a:schemeClr val="bg1"/>
+                </a:solidFill>
+              </a:rPr>
+              <a:t>Two-stage DID Grouped by Initial Insurance Coverage</a:t>
+            </a:r>
+          </a:p>
+        </p:txBody>
+      </p:sp>
+      <p:sp>
+        <p:nvSpPr>
+          <p:cNvPr id="42" name="TextBox 41">
+            <a:extLst>
+              <a:ext uri="{FF2B5EF4-FFF2-40B4-BE49-F238E27FC236}">
+                <a16:creationId xmlns:a16="http://schemas.microsoft.com/office/drawing/2014/main" id="{21CB2217-847C-0A00-B1AA-8BD82B89CC9A}"/>
+              </a:ext>
+            </a:extLst>
+          </p:cNvPr>
+          <p:cNvSpPr txBox="1"/>
+          <p:nvPr/>
+        </p:nvSpPr>
+        <p:spPr>
+          <a:xfrm>
+            <a:off x="13164854" y="31580662"/>
+            <a:ext cx="5285983" cy="369332"/>
+          </a:xfrm>
+          <a:prstGeom prst="rect">
+            <a:avLst/>
+          </a:prstGeom>
+          <a:noFill/>
+        </p:spPr>
+        <p:txBody>
+          <a:bodyPr wrap="square" rtlCol="0">
+            <a:spAutoFit/>
+          </a:bodyPr>
+          <a:lstStyle/>
+          <a:p>
+            <a:pPr algn="ctr"/>
+            <a:r>
+              <a:rPr lang="en-US" dirty="0">
+                <a:solidFill>
+                  <a:schemeClr val="bg1"/>
+                </a:solidFill>
+              </a:rPr>
+              <a:t>Adjacent Cohorts Analysis</a:t>
+            </a:r>
+          </a:p>
+        </p:txBody>
+      </p:sp>
+      <p:sp>
+        <p:nvSpPr>
+          <p:cNvPr id="43" name="TextBox 42">
+            <a:extLst>
+              <a:ext uri="{FF2B5EF4-FFF2-40B4-BE49-F238E27FC236}">
+                <a16:creationId xmlns:a16="http://schemas.microsoft.com/office/drawing/2014/main" id="{27E092F0-2088-785B-29D7-FAA0A9C3CDF5}"/>
+              </a:ext>
+            </a:extLst>
+          </p:cNvPr>
+          <p:cNvSpPr txBox="1"/>
+          <p:nvPr/>
+        </p:nvSpPr>
+        <p:spPr>
+          <a:xfrm>
+            <a:off x="12989490" y="32171164"/>
+            <a:ext cx="2948150" cy="307777"/>
+          </a:xfrm>
+          <a:prstGeom prst="rect">
+            <a:avLst/>
+          </a:prstGeom>
+          <a:noFill/>
+        </p:spPr>
+        <p:txBody>
+          <a:bodyPr wrap="square" rtlCol="0">
+            <a:spAutoFit/>
+          </a:bodyPr>
+          <a:lstStyle/>
+          <a:p>
+            <a:pPr algn="ctr"/>
+            <a:r>
+              <a:rPr lang="en-US" sz="1400" dirty="0">
+                <a:solidFill>
+                  <a:schemeClr val="bg1"/>
+                </a:solidFill>
+              </a:rPr>
+              <a:t>Preliminary Analysis: Plots &amp; Maps</a:t>
+            </a:r>
+          </a:p>
+        </p:txBody>
+      </p:sp>
+      <p:sp>
+        <p:nvSpPr>
+          <p:cNvPr id="44" name="TextBox 43">
+            <a:extLst>
+              <a:ext uri="{FF2B5EF4-FFF2-40B4-BE49-F238E27FC236}">
+                <a16:creationId xmlns:a16="http://schemas.microsoft.com/office/drawing/2014/main" id="{559DC3F2-003D-88A1-584E-D2596A648AB4}"/>
+              </a:ext>
+            </a:extLst>
+          </p:cNvPr>
+          <p:cNvSpPr txBox="1"/>
+          <p:nvPr/>
+        </p:nvSpPr>
+        <p:spPr>
+          <a:xfrm>
+            <a:off x="15839162" y="32134467"/>
+            <a:ext cx="2948150" cy="523220"/>
+          </a:xfrm>
+          <a:prstGeom prst="rect">
+            <a:avLst/>
+          </a:prstGeom>
+          <a:noFill/>
+        </p:spPr>
+        <p:txBody>
+          <a:bodyPr wrap="square" rtlCol="0">
+            <a:spAutoFit/>
+          </a:bodyPr>
+          <a:lstStyle/>
+          <a:p>
+            <a:pPr algn="ctr"/>
+            <a:r>
+              <a:rPr lang="en-US" sz="1400" dirty="0">
+                <a:solidFill>
+                  <a:schemeClr val="bg1"/>
+                </a:solidFill>
+              </a:rPr>
+              <a:t>Regional Causal Effect Analysis</a:t>
+            </a:r>
+          </a:p>
+          <a:p>
+            <a:pPr algn="ctr"/>
+            <a:r>
+              <a:rPr lang="en-US" sz="1400" dirty="0">
+                <a:solidFill>
+                  <a:schemeClr val="bg1"/>
+                </a:solidFill>
+              </a:rPr>
+              <a:t>w/ Synthetic Difference-in-Difference</a:t>
+            </a:r>
+          </a:p>
+        </p:txBody>
+      </p:sp>
+      <p:pic>
+        <p:nvPicPr>
+          <p:cNvPr id="48" name="Picture 47" descr="A green rectangle with white text&#10;&#10;Description automatically generated">
+            <a:extLst>
+              <a:ext uri="{FF2B5EF4-FFF2-40B4-BE49-F238E27FC236}">
+                <a16:creationId xmlns:a16="http://schemas.microsoft.com/office/drawing/2014/main" id="{3FA16160-FAB5-C798-F21F-1E43F1B1815C}"/>
+              </a:ext>
+            </a:extLst>
+          </p:cNvPr>
+          <p:cNvPicPr>
+            <a:picLocks noChangeAspect="1"/>
+          </p:cNvPicPr>
+          <p:nvPr/>
+        </p:nvPicPr>
+        <p:blipFill>
+          <a:blip r:embed="rId13">
+            <a:extLst>
+              <a:ext uri="{28A0092B-C50C-407E-A947-70E740481C1C}">
+                <a14:useLocalDpi xmlns:a14="http://schemas.microsoft.com/office/drawing/2010/main" val="0"/>
+              </a:ext>
+            </a:extLst>
+          </a:blip>
+          <a:stretch>
+            <a:fillRect/>
+          </a:stretch>
+        </p:blipFill>
+        <p:spPr>
+          <a:xfrm>
+            <a:off x="19298483" y="26466707"/>
+            <a:ext cx="1237872" cy="6543675"/>
+          </a:xfrm>
+          <a:prstGeom prst="rect">
+            <a:avLst/>
+          </a:prstGeom>
+        </p:spPr>
+      </p:pic>
+      <p:sp>
+        <p:nvSpPr>
+          <p:cNvPr id="50" name="Rectangle 49">
+            <a:extLst>
+              <a:ext uri="{FF2B5EF4-FFF2-40B4-BE49-F238E27FC236}">
+                <a16:creationId xmlns:a16="http://schemas.microsoft.com/office/drawing/2014/main" id="{6B0A2D18-E0A3-5ECE-2AAB-4C64BCB88D56}"/>
+              </a:ext>
+            </a:extLst>
+          </p:cNvPr>
+          <p:cNvSpPr/>
+          <p:nvPr/>
+        </p:nvSpPr>
+        <p:spPr>
+          <a:xfrm>
+            <a:off x="0" y="3542058"/>
+            <a:ext cx="32918400" cy="344142"/>
+          </a:xfrm>
+          <a:prstGeom prst="rect">
+            <a:avLst/>
+          </a:prstGeom>
+          <a:gradFill>
+            <a:gsLst>
+              <a:gs pos="0">
+                <a:schemeClr val="accent4">
+                  <a:lumMod val="60000"/>
+                  <a:lumOff val="40000"/>
+                </a:schemeClr>
+              </a:gs>
+              <a:gs pos="100000">
+                <a:srgbClr val="002060"/>
+              </a:gs>
+            </a:gsLst>
+            <a:lin ang="0" scaled="0"/>
+          </a:gradFill>
+        </p:spPr>
+        <p:style>
+          <a:lnRef idx="2">
+            <a:schemeClr val="accent1">
+              <a:shade val="15000"/>
+            </a:schemeClr>
+          </a:lnRef>
+          <a:fillRef idx="1">
+            <a:schemeClr val="accent1"/>
+          </a:fillRef>
+          <a:effectRef idx="0">
+            <a:schemeClr val="accent1"/>
+          </a:effectRef>
+          <a:fontRef idx="minor">
+            <a:schemeClr val="lt1"/>
+          </a:fontRef>
+        </p:style>
+        <p:txBody>
+          <a:bodyPr rtlCol="0" anchor="ctr"/>
+          <a:lstStyle/>
+          <a:p>
+            <a:pPr algn="ctr"/>
+            <a:endParaRPr lang="en-US"/>
+          </a:p>
+        </p:txBody>
+      </p:sp>
+      <p:sp>
+        <p:nvSpPr>
+          <p:cNvPr id="51" name="TextBox 50">
+            <a:extLst>
+              <a:ext uri="{FF2B5EF4-FFF2-40B4-BE49-F238E27FC236}">
+                <a16:creationId xmlns:a16="http://schemas.microsoft.com/office/drawing/2014/main" id="{91DED90F-16CF-273A-BC5E-BC6DC10F65A0}"/>
+              </a:ext>
+            </a:extLst>
+          </p:cNvPr>
+          <p:cNvSpPr txBox="1"/>
+          <p:nvPr/>
+        </p:nvSpPr>
+        <p:spPr>
+          <a:xfrm>
+            <a:off x="7105541" y="797146"/>
+            <a:ext cx="18796000" cy="1569660"/>
+          </a:xfrm>
+          <a:prstGeom prst="rect">
+            <a:avLst/>
+          </a:prstGeom>
+          <a:noFill/>
+        </p:spPr>
+        <p:txBody>
+          <a:bodyPr wrap="square" rtlCol="0">
+            <a:spAutoFit/>
+          </a:bodyPr>
+          <a:lstStyle/>
+          <a:p>
+            <a:pPr algn="ctr"/>
+            <a:r>
+              <a:rPr lang="en-US" sz="9600" dirty="0"/>
+              <a:t>MMMMM TITLE GOOOD</a:t>
+            </a:r>
+          </a:p>
+        </p:txBody>
+      </p:sp>
     </p:spTree>
     <p:extLst>
       <p:ext uri="{BB962C8B-B14F-4D97-AF65-F5344CB8AC3E}">

</xml_diff>